<commit_message>
Split GlowEffect into components
</commit_message>
<xml_diff>
--- a/doc/test/SyncLab/SyncLab_GlowEffect.pptx
+++ b/doc/test/SyncLab/SyncLab_GlowEffect.pptx
@@ -6,7 +6,11 @@
   </p:sldMasterIdLst>
   <p:sldIdLst>
     <p:sldId id="256" r:id="rId2"/>
-    <p:sldId id="257" r:id="rId3"/>
+    <p:sldId id="262" r:id="rId3"/>
+    <p:sldId id="264" r:id="rId4"/>
+    <p:sldId id="265" r:id="rId5"/>
+    <p:sldId id="266" r:id="rId6"/>
+    <p:sldId id="267" r:id="rId7"/>
   </p:sldIdLst>
   <p:sldSz cx="12192000" cy="6858000"/>
   <p:notesSz cx="6858000" cy="9144000"/>
@@ -106,11 +110,37 @@
     </a:lvl9pPr>
   </p:defaultTextStyle>
   <p:extLst>
+    <p:ext uri="{521415D9-36F7-43E2-AB2F-B90AF26B5E84}">
+      <p14:sectionLst xmlns:p14="http://schemas.microsoft.com/office/powerpoint/2010/main">
+        <p14:section name="RadiusTest" id="{DCBA1EE2-68D4-42A4-80E3-8E92D999FB55}">
+          <p14:sldIdLst>
+            <p14:sldId id="256"/>
+            <p14:sldId id="262"/>
+          </p14:sldIdLst>
+        </p14:section>
+        <p14:section name="ColorTest" id="{2DBA1629-79D9-4194-9A25-38E39AA92431}">
+          <p14:sldIdLst>
+            <p14:sldId id="264"/>
+            <p14:sldId id="265"/>
+          </p14:sldIdLst>
+        </p14:section>
+        <p14:section name="TransparencyTest" id="{7D0B6CFE-4E50-4A5B-A72C-F11AAA5EC285}">
+          <p14:sldIdLst>
+            <p14:sldId id="266"/>
+            <p14:sldId id="267"/>
+          </p14:sldIdLst>
+        </p14:section>
+      </p14:sectionLst>
+    </p:ext>
     <p:ext uri="{EFAFB233-063F-42B5-8137-9DF3F51BA10A}">
       <p15:sldGuideLst xmlns:p15="http://schemas.microsoft.com/office/powerpoint/2012/main"/>
     </p:ext>
   </p:extLst>
 </p:presentation>
+</file>
+
+<file path=ppt/revisionInfo.xml><?xml version="1.0" encoding="utf-8"?>
+<p1510:revInfo xmlns:a="http://schemas.openxmlformats.org/drawingml/2006/main" xmlns:r="http://schemas.openxmlformats.org/officeDocument/2006/relationships" xmlns:p1510="http://schemas.microsoft.com/office/powerpoint/2015/10/main"/>
 </file>
 
 <file path=ppt/slideLayouts/slideLayout1.xml><?xml version="1.0" encoding="utf-8"?>
@@ -155,10 +185,9 @@
           </a:lstStyle>
           <a:p>
             <a:r>
-              <a:rPr lang="en-US" smtClean="0"/>
+              <a:rPr lang="en-US"/>
               <a:t>Click to edit Master title style</a:t>
             </a:r>
-            <a:endParaRPr lang="en-US"/>
           </a:p>
         </p:txBody>
       </p:sp>
@@ -220,10 +249,9 @@
           </a:lstStyle>
           <a:p>
             <a:r>
-              <a:rPr lang="en-US" smtClean="0"/>
+              <a:rPr lang="en-US"/>
               <a:t>Click to edit Master subtitle style</a:t>
             </a:r>
-            <a:endParaRPr lang="en-US"/>
           </a:p>
         </p:txBody>
       </p:sp>
@@ -244,7 +272,7 @@
           <a:p>
             <a:fld id="{4B476C04-EB19-42DC-A71A-2EA3A859795F}" type="datetimeFigureOut">
               <a:rPr lang="en-US" smtClean="0"/>
-              <a:t>4/2/2018</a:t>
+              <a:t>4/10/2018</a:t>
             </a:fld>
             <a:endParaRPr lang="en-US"/>
           </a:p>
@@ -338,10 +366,9 @@
           <a:lstStyle/>
           <a:p>
             <a:r>
-              <a:rPr lang="en-US" smtClean="0"/>
+              <a:rPr lang="en-US"/>
               <a:t>Click to edit Master title style</a:t>
             </a:r>
-            <a:endParaRPr lang="en-US"/>
           </a:p>
         </p:txBody>
       </p:sp>
@@ -362,38 +389,37 @@
           <a:p>
             <a:pPr lvl="0"/>
             <a:r>
-              <a:rPr lang="en-US" smtClean="0"/>
+              <a:rPr lang="en-US"/>
               <a:t>Click to edit Master text styles</a:t>
             </a:r>
           </a:p>
           <a:p>
             <a:pPr lvl="1"/>
             <a:r>
-              <a:rPr lang="en-US" smtClean="0"/>
+              <a:rPr lang="en-US"/>
               <a:t>Second level</a:t>
             </a:r>
           </a:p>
           <a:p>
             <a:pPr lvl="2"/>
             <a:r>
-              <a:rPr lang="en-US" smtClean="0"/>
+              <a:rPr lang="en-US"/>
               <a:t>Third level</a:t>
             </a:r>
           </a:p>
           <a:p>
             <a:pPr lvl="3"/>
             <a:r>
-              <a:rPr lang="en-US" smtClean="0"/>
+              <a:rPr lang="en-US"/>
               <a:t>Fourth level</a:t>
             </a:r>
           </a:p>
           <a:p>
             <a:pPr lvl="4"/>
             <a:r>
-              <a:rPr lang="en-US" smtClean="0"/>
+              <a:rPr lang="en-US"/>
               <a:t>Fifth level</a:t>
             </a:r>
-            <a:endParaRPr lang="en-US"/>
           </a:p>
         </p:txBody>
       </p:sp>
@@ -414,7 +440,7 @@
           <a:p>
             <a:fld id="{4B476C04-EB19-42DC-A71A-2EA3A859795F}" type="datetimeFigureOut">
               <a:rPr lang="en-US" smtClean="0"/>
-              <a:t>4/2/2018</a:t>
+              <a:t>4/10/2018</a:t>
             </a:fld>
             <a:endParaRPr lang="en-US"/>
           </a:p>
@@ -513,10 +539,9 @@
           <a:lstStyle/>
           <a:p>
             <a:r>
-              <a:rPr lang="en-US" smtClean="0"/>
+              <a:rPr lang="en-US"/>
               <a:t>Click to edit Master title style</a:t>
             </a:r>
-            <a:endParaRPr lang="en-US"/>
           </a:p>
         </p:txBody>
       </p:sp>
@@ -542,38 +567,37 @@
           <a:p>
             <a:pPr lvl="0"/>
             <a:r>
-              <a:rPr lang="en-US" smtClean="0"/>
+              <a:rPr lang="en-US"/>
               <a:t>Click to edit Master text styles</a:t>
             </a:r>
           </a:p>
           <a:p>
             <a:pPr lvl="1"/>
             <a:r>
-              <a:rPr lang="en-US" smtClean="0"/>
+              <a:rPr lang="en-US"/>
               <a:t>Second level</a:t>
             </a:r>
           </a:p>
           <a:p>
             <a:pPr lvl="2"/>
             <a:r>
-              <a:rPr lang="en-US" smtClean="0"/>
+              <a:rPr lang="en-US"/>
               <a:t>Third level</a:t>
             </a:r>
           </a:p>
           <a:p>
             <a:pPr lvl="3"/>
             <a:r>
-              <a:rPr lang="en-US" smtClean="0"/>
+              <a:rPr lang="en-US"/>
               <a:t>Fourth level</a:t>
             </a:r>
           </a:p>
           <a:p>
             <a:pPr lvl="4"/>
             <a:r>
-              <a:rPr lang="en-US" smtClean="0"/>
+              <a:rPr lang="en-US"/>
               <a:t>Fifth level</a:t>
             </a:r>
-            <a:endParaRPr lang="en-US"/>
           </a:p>
         </p:txBody>
       </p:sp>
@@ -594,7 +618,7 @@
           <a:p>
             <a:fld id="{4B476C04-EB19-42DC-A71A-2EA3A859795F}" type="datetimeFigureOut">
               <a:rPr lang="en-US" smtClean="0"/>
-              <a:t>4/2/2018</a:t>
+              <a:t>4/10/2018</a:t>
             </a:fld>
             <a:endParaRPr lang="en-US"/>
           </a:p>
@@ -688,10 +712,9 @@
           <a:lstStyle/>
           <a:p>
             <a:r>
-              <a:rPr lang="en-US" smtClean="0"/>
+              <a:rPr lang="en-US"/>
               <a:t>Click to edit Master title style</a:t>
             </a:r>
-            <a:endParaRPr lang="en-US"/>
           </a:p>
         </p:txBody>
       </p:sp>
@@ -712,38 +735,37 @@
           <a:p>
             <a:pPr lvl="0"/>
             <a:r>
-              <a:rPr lang="en-US" smtClean="0"/>
+              <a:rPr lang="en-US"/>
               <a:t>Click to edit Master text styles</a:t>
             </a:r>
           </a:p>
           <a:p>
             <a:pPr lvl="1"/>
             <a:r>
-              <a:rPr lang="en-US" smtClean="0"/>
+              <a:rPr lang="en-US"/>
               <a:t>Second level</a:t>
             </a:r>
           </a:p>
           <a:p>
             <a:pPr lvl="2"/>
             <a:r>
-              <a:rPr lang="en-US" smtClean="0"/>
+              <a:rPr lang="en-US"/>
               <a:t>Third level</a:t>
             </a:r>
           </a:p>
           <a:p>
             <a:pPr lvl="3"/>
             <a:r>
-              <a:rPr lang="en-US" smtClean="0"/>
+              <a:rPr lang="en-US"/>
               <a:t>Fourth level</a:t>
             </a:r>
           </a:p>
           <a:p>
             <a:pPr lvl="4"/>
             <a:r>
-              <a:rPr lang="en-US" smtClean="0"/>
+              <a:rPr lang="en-US"/>
               <a:t>Fifth level</a:t>
             </a:r>
-            <a:endParaRPr lang="en-US"/>
           </a:p>
         </p:txBody>
       </p:sp>
@@ -764,7 +786,7 @@
           <a:p>
             <a:fld id="{4B476C04-EB19-42DC-A71A-2EA3A859795F}" type="datetimeFigureOut">
               <a:rPr lang="en-US" smtClean="0"/>
-              <a:t>4/2/2018</a:t>
+              <a:t>4/10/2018</a:t>
             </a:fld>
             <a:endParaRPr lang="en-US"/>
           </a:p>
@@ -867,10 +889,9 @@
           </a:lstStyle>
           <a:p>
             <a:r>
-              <a:rPr lang="en-US" smtClean="0"/>
+              <a:rPr lang="en-US"/>
               <a:t>Click to edit Master title style</a:t>
             </a:r>
-            <a:endParaRPr lang="en-US"/>
           </a:p>
         </p:txBody>
       </p:sp>
@@ -987,7 +1008,7 @@
           <a:p>
             <a:pPr lvl="0"/>
             <a:r>
-              <a:rPr lang="en-US" smtClean="0"/>
+              <a:rPr lang="en-US"/>
               <a:t>Click to edit Master text styles</a:t>
             </a:r>
           </a:p>
@@ -1010,7 +1031,7 @@
           <a:p>
             <a:fld id="{4B476C04-EB19-42DC-A71A-2EA3A859795F}" type="datetimeFigureOut">
               <a:rPr lang="en-US" smtClean="0"/>
-              <a:t>4/2/2018</a:t>
+              <a:t>4/10/2018</a:t>
             </a:fld>
             <a:endParaRPr lang="en-US"/>
           </a:p>
@@ -1104,10 +1125,9 @@
           <a:lstStyle/>
           <a:p>
             <a:r>
-              <a:rPr lang="en-US" smtClean="0"/>
+              <a:rPr lang="en-US"/>
               <a:t>Click to edit Master title style</a:t>
             </a:r>
-            <a:endParaRPr lang="en-US"/>
           </a:p>
         </p:txBody>
       </p:sp>
@@ -1133,38 +1153,37 @@
           <a:p>
             <a:pPr lvl="0"/>
             <a:r>
-              <a:rPr lang="en-US" smtClean="0"/>
+              <a:rPr lang="en-US"/>
               <a:t>Click to edit Master text styles</a:t>
             </a:r>
           </a:p>
           <a:p>
             <a:pPr lvl="1"/>
             <a:r>
-              <a:rPr lang="en-US" smtClean="0"/>
+              <a:rPr lang="en-US"/>
               <a:t>Second level</a:t>
             </a:r>
           </a:p>
           <a:p>
             <a:pPr lvl="2"/>
             <a:r>
-              <a:rPr lang="en-US" smtClean="0"/>
+              <a:rPr lang="en-US"/>
               <a:t>Third level</a:t>
             </a:r>
           </a:p>
           <a:p>
             <a:pPr lvl="3"/>
             <a:r>
-              <a:rPr lang="en-US" smtClean="0"/>
+              <a:rPr lang="en-US"/>
               <a:t>Fourth level</a:t>
             </a:r>
           </a:p>
           <a:p>
             <a:pPr lvl="4"/>
             <a:r>
-              <a:rPr lang="en-US" smtClean="0"/>
+              <a:rPr lang="en-US"/>
               <a:t>Fifth level</a:t>
             </a:r>
-            <a:endParaRPr lang="en-US"/>
           </a:p>
         </p:txBody>
       </p:sp>
@@ -1190,38 +1209,37 @@
           <a:p>
             <a:pPr lvl="0"/>
             <a:r>
-              <a:rPr lang="en-US" smtClean="0"/>
+              <a:rPr lang="en-US"/>
               <a:t>Click to edit Master text styles</a:t>
             </a:r>
           </a:p>
           <a:p>
             <a:pPr lvl="1"/>
             <a:r>
-              <a:rPr lang="en-US" smtClean="0"/>
+              <a:rPr lang="en-US"/>
               <a:t>Second level</a:t>
             </a:r>
           </a:p>
           <a:p>
             <a:pPr lvl="2"/>
             <a:r>
-              <a:rPr lang="en-US" smtClean="0"/>
+              <a:rPr lang="en-US"/>
               <a:t>Third level</a:t>
             </a:r>
           </a:p>
           <a:p>
             <a:pPr lvl="3"/>
             <a:r>
-              <a:rPr lang="en-US" smtClean="0"/>
+              <a:rPr lang="en-US"/>
               <a:t>Fourth level</a:t>
             </a:r>
           </a:p>
           <a:p>
             <a:pPr lvl="4"/>
             <a:r>
-              <a:rPr lang="en-US" smtClean="0"/>
+              <a:rPr lang="en-US"/>
               <a:t>Fifth level</a:t>
             </a:r>
-            <a:endParaRPr lang="en-US"/>
           </a:p>
         </p:txBody>
       </p:sp>
@@ -1242,7 +1260,7 @@
           <a:p>
             <a:fld id="{4B476C04-EB19-42DC-A71A-2EA3A859795F}" type="datetimeFigureOut">
               <a:rPr lang="en-US" smtClean="0"/>
-              <a:t>4/2/2018</a:t>
+              <a:t>4/10/2018</a:t>
             </a:fld>
             <a:endParaRPr lang="en-US"/>
           </a:p>
@@ -1341,10 +1359,9 @@
           <a:lstStyle/>
           <a:p>
             <a:r>
-              <a:rPr lang="en-US" smtClean="0"/>
+              <a:rPr lang="en-US"/>
               <a:t>Click to edit Master title style</a:t>
             </a:r>
-            <a:endParaRPr lang="en-US"/>
           </a:p>
         </p:txBody>
       </p:sp>
@@ -1407,7 +1424,7 @@
           <a:p>
             <a:pPr lvl="0"/>
             <a:r>
-              <a:rPr lang="en-US" smtClean="0"/>
+              <a:rPr lang="en-US"/>
               <a:t>Click to edit Master text styles</a:t>
             </a:r>
           </a:p>
@@ -1435,38 +1452,37 @@
           <a:p>
             <a:pPr lvl="0"/>
             <a:r>
-              <a:rPr lang="en-US" smtClean="0"/>
+              <a:rPr lang="en-US"/>
               <a:t>Click to edit Master text styles</a:t>
             </a:r>
           </a:p>
           <a:p>
             <a:pPr lvl="1"/>
             <a:r>
-              <a:rPr lang="en-US" smtClean="0"/>
+              <a:rPr lang="en-US"/>
               <a:t>Second level</a:t>
             </a:r>
           </a:p>
           <a:p>
             <a:pPr lvl="2"/>
             <a:r>
-              <a:rPr lang="en-US" smtClean="0"/>
+              <a:rPr lang="en-US"/>
               <a:t>Third level</a:t>
             </a:r>
           </a:p>
           <a:p>
             <a:pPr lvl="3"/>
             <a:r>
-              <a:rPr lang="en-US" smtClean="0"/>
+              <a:rPr lang="en-US"/>
               <a:t>Fourth level</a:t>
             </a:r>
           </a:p>
           <a:p>
             <a:pPr lvl="4"/>
             <a:r>
-              <a:rPr lang="en-US" smtClean="0"/>
+              <a:rPr lang="en-US"/>
               <a:t>Fifth level</a:t>
             </a:r>
-            <a:endParaRPr lang="en-US"/>
           </a:p>
         </p:txBody>
       </p:sp>
@@ -1529,7 +1545,7 @@
           <a:p>
             <a:pPr lvl="0"/>
             <a:r>
-              <a:rPr lang="en-US" smtClean="0"/>
+              <a:rPr lang="en-US"/>
               <a:t>Click to edit Master text styles</a:t>
             </a:r>
           </a:p>
@@ -1557,38 +1573,37 @@
           <a:p>
             <a:pPr lvl="0"/>
             <a:r>
-              <a:rPr lang="en-US" smtClean="0"/>
+              <a:rPr lang="en-US"/>
               <a:t>Click to edit Master text styles</a:t>
             </a:r>
           </a:p>
           <a:p>
             <a:pPr lvl="1"/>
             <a:r>
-              <a:rPr lang="en-US" smtClean="0"/>
+              <a:rPr lang="en-US"/>
               <a:t>Second level</a:t>
             </a:r>
           </a:p>
           <a:p>
             <a:pPr lvl="2"/>
             <a:r>
-              <a:rPr lang="en-US" smtClean="0"/>
+              <a:rPr lang="en-US"/>
               <a:t>Third level</a:t>
             </a:r>
           </a:p>
           <a:p>
             <a:pPr lvl="3"/>
             <a:r>
-              <a:rPr lang="en-US" smtClean="0"/>
+              <a:rPr lang="en-US"/>
               <a:t>Fourth level</a:t>
             </a:r>
           </a:p>
           <a:p>
             <a:pPr lvl="4"/>
             <a:r>
-              <a:rPr lang="en-US" smtClean="0"/>
+              <a:rPr lang="en-US"/>
               <a:t>Fifth level</a:t>
             </a:r>
-            <a:endParaRPr lang="en-US"/>
           </a:p>
         </p:txBody>
       </p:sp>
@@ -1609,7 +1624,7 @@
           <a:p>
             <a:fld id="{4B476C04-EB19-42DC-A71A-2EA3A859795F}" type="datetimeFigureOut">
               <a:rPr lang="en-US" smtClean="0"/>
-              <a:t>4/2/2018</a:t>
+              <a:t>4/10/2018</a:t>
             </a:fld>
             <a:endParaRPr lang="en-US"/>
           </a:p>
@@ -1703,10 +1718,9 @@
           <a:lstStyle/>
           <a:p>
             <a:r>
-              <a:rPr lang="en-US" smtClean="0"/>
+              <a:rPr lang="en-US"/>
               <a:t>Click to edit Master title style</a:t>
             </a:r>
-            <a:endParaRPr lang="en-US"/>
           </a:p>
         </p:txBody>
       </p:sp>
@@ -1727,7 +1741,7 @@
           <a:p>
             <a:fld id="{4B476C04-EB19-42DC-A71A-2EA3A859795F}" type="datetimeFigureOut">
               <a:rPr lang="en-US" smtClean="0"/>
-              <a:t>4/2/2018</a:t>
+              <a:t>4/10/2018</a:t>
             </a:fld>
             <a:endParaRPr lang="en-US"/>
           </a:p>
@@ -1822,7 +1836,7 @@
           <a:p>
             <a:fld id="{4B476C04-EB19-42DC-A71A-2EA3A859795F}" type="datetimeFigureOut">
               <a:rPr lang="en-US" smtClean="0"/>
-              <a:t>4/2/2018</a:t>
+              <a:t>4/10/2018</a:t>
             </a:fld>
             <a:endParaRPr lang="en-US"/>
           </a:p>
@@ -1925,10 +1939,9 @@
           </a:lstStyle>
           <a:p>
             <a:r>
-              <a:rPr lang="en-US" smtClean="0"/>
+              <a:rPr lang="en-US"/>
               <a:t>Click to edit Master title style</a:t>
             </a:r>
-            <a:endParaRPr lang="en-US"/>
           </a:p>
         </p:txBody>
       </p:sp>
@@ -1982,38 +1995,37 @@
           <a:p>
             <a:pPr lvl="0"/>
             <a:r>
-              <a:rPr lang="en-US" smtClean="0"/>
+              <a:rPr lang="en-US"/>
               <a:t>Click to edit Master text styles</a:t>
             </a:r>
           </a:p>
           <a:p>
             <a:pPr lvl="1"/>
             <a:r>
-              <a:rPr lang="en-US" smtClean="0"/>
+              <a:rPr lang="en-US"/>
               <a:t>Second level</a:t>
             </a:r>
           </a:p>
           <a:p>
             <a:pPr lvl="2"/>
             <a:r>
-              <a:rPr lang="en-US" smtClean="0"/>
+              <a:rPr lang="en-US"/>
               <a:t>Third level</a:t>
             </a:r>
           </a:p>
           <a:p>
             <a:pPr lvl="3"/>
             <a:r>
-              <a:rPr lang="en-US" smtClean="0"/>
+              <a:rPr lang="en-US"/>
               <a:t>Fourth level</a:t>
             </a:r>
           </a:p>
           <a:p>
             <a:pPr lvl="4"/>
             <a:r>
-              <a:rPr lang="en-US" smtClean="0"/>
+              <a:rPr lang="en-US"/>
               <a:t>Fifth level</a:t>
             </a:r>
-            <a:endParaRPr lang="en-US"/>
           </a:p>
         </p:txBody>
       </p:sp>
@@ -2076,7 +2088,7 @@
           <a:p>
             <a:pPr lvl="0"/>
             <a:r>
-              <a:rPr lang="en-US" smtClean="0"/>
+              <a:rPr lang="en-US"/>
               <a:t>Click to edit Master text styles</a:t>
             </a:r>
           </a:p>
@@ -2099,7 +2111,7 @@
           <a:p>
             <a:fld id="{4B476C04-EB19-42DC-A71A-2EA3A859795F}" type="datetimeFigureOut">
               <a:rPr lang="en-US" smtClean="0"/>
-              <a:t>4/2/2018</a:t>
+              <a:t>4/10/2018</a:t>
             </a:fld>
             <a:endParaRPr lang="en-US"/>
           </a:p>
@@ -2202,10 +2214,9 @@
           </a:lstStyle>
           <a:p>
             <a:r>
-              <a:rPr lang="en-US" smtClean="0"/>
+              <a:rPr lang="en-US"/>
               <a:t>Click to edit Master title style</a:t>
             </a:r>
-            <a:endParaRPr lang="en-US"/>
           </a:p>
         </p:txBody>
       </p:sp>
@@ -2329,7 +2340,7 @@
           <a:p>
             <a:pPr lvl="0"/>
             <a:r>
-              <a:rPr lang="en-US" smtClean="0"/>
+              <a:rPr lang="en-US"/>
               <a:t>Click to edit Master text styles</a:t>
             </a:r>
           </a:p>
@@ -2352,7 +2363,7 @@
           <a:p>
             <a:fld id="{4B476C04-EB19-42DC-A71A-2EA3A859795F}" type="datetimeFigureOut">
               <a:rPr lang="en-US" smtClean="0"/>
-              <a:t>4/2/2018</a:t>
+              <a:t>4/10/2018</a:t>
             </a:fld>
             <a:endParaRPr lang="en-US"/>
           </a:p>
@@ -2461,10 +2472,9 @@
           <a:lstStyle/>
           <a:p>
             <a:r>
-              <a:rPr lang="en-US" smtClean="0"/>
+              <a:rPr lang="en-US"/>
               <a:t>Click to edit Master title style</a:t>
             </a:r>
-            <a:endParaRPr lang="en-US"/>
           </a:p>
         </p:txBody>
       </p:sp>
@@ -2495,38 +2505,37 @@
           <a:p>
             <a:pPr lvl="0"/>
             <a:r>
-              <a:rPr lang="en-US" smtClean="0"/>
+              <a:rPr lang="en-US"/>
               <a:t>Click to edit Master text styles</a:t>
             </a:r>
           </a:p>
           <a:p>
             <a:pPr lvl="1"/>
             <a:r>
-              <a:rPr lang="en-US" smtClean="0"/>
+              <a:rPr lang="en-US"/>
               <a:t>Second level</a:t>
             </a:r>
           </a:p>
           <a:p>
             <a:pPr lvl="2"/>
             <a:r>
-              <a:rPr lang="en-US" smtClean="0"/>
+              <a:rPr lang="en-US"/>
               <a:t>Third level</a:t>
             </a:r>
           </a:p>
           <a:p>
             <a:pPr lvl="3"/>
             <a:r>
-              <a:rPr lang="en-US" smtClean="0"/>
+              <a:rPr lang="en-US"/>
               <a:t>Fourth level</a:t>
             </a:r>
           </a:p>
           <a:p>
             <a:pPr lvl="4"/>
             <a:r>
-              <a:rPr lang="en-US" smtClean="0"/>
+              <a:rPr lang="en-US"/>
               <a:t>Fifth level</a:t>
             </a:r>
-            <a:endParaRPr lang="en-US"/>
           </a:p>
         </p:txBody>
       </p:sp>
@@ -2565,7 +2574,7 @@
           <a:p>
             <a:fld id="{4B476C04-EB19-42DC-A71A-2EA3A859795F}" type="datetimeFigureOut">
               <a:rPr lang="en-US" smtClean="0"/>
-              <a:t>4/2/2018</a:t>
+              <a:t>4/10/2018</a:t>
             </a:fld>
             <a:endParaRPr lang="en-US"/>
           </a:p>
@@ -2978,14 +2987,26 @@
         </p:nvSpPr>
         <p:spPr>
           <a:xfrm>
-            <a:off x="1202267" y="1591733"/>
+            <a:off x="1307775" y="1811866"/>
             <a:ext cx="2963333" cy="2878667"/>
           </a:xfrm>
           <a:prstGeom prst="rect">
             <a:avLst/>
           </a:prstGeom>
+          <a:solidFill>
+            <a:schemeClr val="accent1"/>
+          </a:solidFill>
+          <a:ln w="12700" cap="flat" cmpd="sng" algn="ctr">
+            <a:solidFill>
+              <a:srgbClr val="41719C"/>
+            </a:solidFill>
+            <a:prstDash val="solid"/>
+            <a:miter lim="800000"/>
+            <a:headEnd type="none" w="med" len="med"/>
+            <a:tailEnd type="none" w="med" len="med"/>
+          </a:ln>
           <a:effectLst>
-            <a:glow rad="228600">
+            <a:glow rad="1320800">
               <a:schemeClr val="accent6">
                 <a:satMod val="175000"/>
                 <a:alpha val="40000"/>
@@ -3014,7 +3035,9 @@
           <a:lstStyle/>
           <a:p>
             <a:pPr algn="ctr"/>
-            <a:endParaRPr lang="en-US"/>
+            <a:endParaRPr lang="en-US" dirty="0">
+              <a:latin typeface="Calibri" panose="020F0502020204030204" pitchFamily="34" charset="0"/>
+            </a:endParaRPr>
           </a:p>
         </p:txBody>
       </p:sp>
@@ -3026,12 +3049,19 @@
         </p:nvSpPr>
         <p:spPr>
           <a:xfrm>
-            <a:off x="6248400" y="1574800"/>
+            <a:off x="8182708" y="1811866"/>
             <a:ext cx="2319867" cy="2438400"/>
           </a:xfrm>
           <a:prstGeom prst="triangle">
             <a:avLst/>
           </a:prstGeom>
+          <a:effectLst>
+            <a:glow rad="228600">
+              <a:schemeClr val="accent2">
+                <a:alpha val="90000"/>
+              </a:schemeClr>
+            </a:glow>
+          </a:effectLst>
         </p:spPr>
         <p:style>
           <a:lnRef idx="2">
@@ -3054,7 +3084,7 @@
           <a:lstStyle/>
           <a:p>
             <a:pPr algn="ctr"/>
-            <a:endParaRPr lang="en-US"/>
+            <a:endParaRPr lang="en-US" dirty="0"/>
           </a:p>
         </p:txBody>
       </p:sp>
@@ -3090,13 +3120,13 @@
       </p:grpSpPr>
       <p:sp>
         <p:nvSpPr>
-          <p:cNvPr id="4" name="Rectangle 3"/>
+          <p:cNvPr id="4" name="Source"/>
           <p:cNvSpPr/>
           <p:nvPr/>
         </p:nvSpPr>
         <p:spPr>
           <a:xfrm>
-            <a:off x="1202267" y="1591733"/>
+            <a:off x="1307775" y="1811866"/>
             <a:ext cx="2963333" cy="2878667"/>
           </a:xfrm>
           <a:prstGeom prst="rect">
@@ -3115,7 +3145,7 @@
             <a:tailEnd type="none" w="med" len="med"/>
           </a:ln>
           <a:effectLst>
-            <a:glow rad="228600">
+            <a:glow rad="1320800">
               <a:schemeClr val="accent6">
                 <a:satMod val="175000"/>
                 <a:alpha val="40000"/>
@@ -3144,7 +3174,7 @@
           <a:lstStyle/>
           <a:p>
             <a:pPr algn="ctr"/>
-            <a:endParaRPr lang="en-US">
+            <a:endParaRPr lang="en-US" dirty="0">
               <a:latin typeface="Calibri" panose="020F0502020204030204" pitchFamily="34" charset="0"/>
             </a:endParaRPr>
           </a:p>
@@ -3152,13 +3182,569 @@
       </p:sp>
       <p:sp>
         <p:nvSpPr>
-          <p:cNvPr id="5" name="Isosceles Triangle 4"/>
+          <p:cNvPr id="5" name="Destination"/>
           <p:cNvSpPr/>
           <p:nvPr/>
         </p:nvSpPr>
         <p:spPr>
           <a:xfrm>
-            <a:off x="6248400" y="1574800"/>
+            <a:off x="8182708" y="1811866"/>
+            <a:ext cx="2319867" cy="2438400"/>
+          </a:xfrm>
+          <a:prstGeom prst="triangle">
+            <a:avLst/>
+          </a:prstGeom>
+          <a:effectLst>
+            <a:glow rad="1320800">
+              <a:schemeClr val="accent2">
+                <a:alpha val="90000"/>
+              </a:schemeClr>
+            </a:glow>
+          </a:effectLst>
+        </p:spPr>
+        <p:style>
+          <a:lnRef idx="2">
+            <a:schemeClr val="accent1">
+              <a:shade val="50000"/>
+            </a:schemeClr>
+          </a:lnRef>
+          <a:fillRef idx="1">
+            <a:schemeClr val="accent1"/>
+          </a:fillRef>
+          <a:effectRef idx="0">
+            <a:schemeClr val="accent1"/>
+          </a:effectRef>
+          <a:fontRef idx="minor">
+            <a:schemeClr val="lt1"/>
+          </a:fontRef>
+        </p:style>
+        <p:txBody>
+          <a:bodyPr rtlCol="0" anchor="ctr"/>
+          <a:lstStyle/>
+          <a:p>
+            <a:pPr algn="ctr"/>
+            <a:endParaRPr lang="en-US"/>
+          </a:p>
+        </p:txBody>
+      </p:sp>
+    </p:spTree>
+    <p:extLst>
+      <p:ext uri="{BB962C8B-B14F-4D97-AF65-F5344CB8AC3E}">
+        <p14:creationId xmlns:p14="http://schemas.microsoft.com/office/powerpoint/2010/main" val="3564795170"/>
+      </p:ext>
+    </p:extLst>
+  </p:cSld>
+  <p:clrMapOvr>
+    <a:masterClrMapping/>
+  </p:clrMapOvr>
+</p:sld>
+</file>
+
+<file path=ppt/slides/slide3.xml><?xml version="1.0" encoding="utf-8"?>
+<p:sld xmlns:a="http://schemas.openxmlformats.org/drawingml/2006/main" xmlns:r="http://schemas.openxmlformats.org/officeDocument/2006/relationships" xmlns:p="http://schemas.openxmlformats.org/presentationml/2006/main">
+  <p:cSld>
+    <p:spTree>
+      <p:nvGrpSpPr>
+        <p:cNvPr id="1" name=""/>
+        <p:cNvGrpSpPr/>
+        <p:nvPr/>
+      </p:nvGrpSpPr>
+      <p:grpSpPr>
+        <a:xfrm>
+          <a:off x="0" y="0"/>
+          <a:ext cx="0" cy="0"/>
+          <a:chOff x="0" y="0"/>
+          <a:chExt cx="0" cy="0"/>
+        </a:xfrm>
+      </p:grpSpPr>
+      <p:sp>
+        <p:nvSpPr>
+          <p:cNvPr id="4" name="Source"/>
+          <p:cNvSpPr/>
+          <p:nvPr/>
+        </p:nvSpPr>
+        <p:spPr>
+          <a:xfrm>
+            <a:off x="1307775" y="1811866"/>
+            <a:ext cx="2963333" cy="2878667"/>
+          </a:xfrm>
+          <a:prstGeom prst="rect">
+            <a:avLst/>
+          </a:prstGeom>
+          <a:solidFill>
+            <a:schemeClr val="accent1"/>
+          </a:solidFill>
+          <a:ln w="12700" cap="flat" cmpd="sng" algn="ctr">
+            <a:solidFill>
+              <a:srgbClr val="41719C"/>
+            </a:solidFill>
+            <a:prstDash val="solid"/>
+            <a:miter lim="800000"/>
+            <a:headEnd type="none" w="med" len="med"/>
+            <a:tailEnd type="none" w="med" len="med"/>
+          </a:ln>
+          <a:effectLst>
+            <a:glow rad="1320800">
+              <a:schemeClr val="accent6">
+                <a:satMod val="175000"/>
+                <a:alpha val="40000"/>
+              </a:schemeClr>
+            </a:glow>
+          </a:effectLst>
+        </p:spPr>
+        <p:style>
+          <a:lnRef idx="2">
+            <a:schemeClr val="accent1">
+              <a:shade val="50000"/>
+            </a:schemeClr>
+          </a:lnRef>
+          <a:fillRef idx="1">
+            <a:schemeClr val="accent1"/>
+          </a:fillRef>
+          <a:effectRef idx="0">
+            <a:schemeClr val="accent1"/>
+          </a:effectRef>
+          <a:fontRef idx="minor">
+            <a:schemeClr val="lt1"/>
+          </a:fontRef>
+        </p:style>
+        <p:txBody>
+          <a:bodyPr rtlCol="0" anchor="ctr"/>
+          <a:lstStyle/>
+          <a:p>
+            <a:pPr algn="ctr"/>
+            <a:endParaRPr lang="en-US" dirty="0">
+              <a:latin typeface="Calibri" panose="020F0502020204030204" pitchFamily="34" charset="0"/>
+            </a:endParaRPr>
+          </a:p>
+        </p:txBody>
+      </p:sp>
+      <p:sp>
+        <p:nvSpPr>
+          <p:cNvPr id="5" name="Destination"/>
+          <p:cNvSpPr/>
+          <p:nvPr/>
+        </p:nvSpPr>
+        <p:spPr>
+          <a:xfrm>
+            <a:off x="8182708" y="1811866"/>
+            <a:ext cx="2319867" cy="2438400"/>
+          </a:xfrm>
+          <a:prstGeom prst="triangle">
+            <a:avLst/>
+          </a:prstGeom>
+          <a:effectLst>
+            <a:glow rad="228600">
+              <a:schemeClr val="accent2">
+                <a:alpha val="90000"/>
+              </a:schemeClr>
+            </a:glow>
+          </a:effectLst>
+        </p:spPr>
+        <p:style>
+          <a:lnRef idx="2">
+            <a:schemeClr val="accent1">
+              <a:shade val="50000"/>
+            </a:schemeClr>
+          </a:lnRef>
+          <a:fillRef idx="1">
+            <a:schemeClr val="accent1"/>
+          </a:fillRef>
+          <a:effectRef idx="0">
+            <a:schemeClr val="accent1"/>
+          </a:effectRef>
+          <a:fontRef idx="minor">
+            <a:schemeClr val="lt1"/>
+          </a:fontRef>
+        </p:style>
+        <p:txBody>
+          <a:bodyPr rtlCol="0" anchor="ctr"/>
+          <a:lstStyle/>
+          <a:p>
+            <a:pPr algn="ctr"/>
+            <a:endParaRPr lang="en-US" dirty="0"/>
+          </a:p>
+        </p:txBody>
+      </p:sp>
+    </p:spTree>
+    <p:extLst>
+      <p:ext uri="{BB962C8B-B14F-4D97-AF65-F5344CB8AC3E}">
+        <p14:creationId xmlns:p14="http://schemas.microsoft.com/office/powerpoint/2010/main" val="2198897014"/>
+      </p:ext>
+    </p:extLst>
+  </p:cSld>
+  <p:clrMapOvr>
+    <a:masterClrMapping/>
+  </p:clrMapOvr>
+</p:sld>
+</file>
+
+<file path=ppt/slides/slide4.xml><?xml version="1.0" encoding="utf-8"?>
+<p:sld xmlns:a="http://schemas.openxmlformats.org/drawingml/2006/main" xmlns:r="http://schemas.openxmlformats.org/officeDocument/2006/relationships" xmlns:p="http://schemas.openxmlformats.org/presentationml/2006/main">
+  <p:cSld>
+    <p:spTree>
+      <p:nvGrpSpPr>
+        <p:cNvPr id="1" name=""/>
+        <p:cNvGrpSpPr/>
+        <p:nvPr/>
+      </p:nvGrpSpPr>
+      <p:grpSpPr>
+        <a:xfrm>
+          <a:off x="0" y="0"/>
+          <a:ext cx="0" cy="0"/>
+          <a:chOff x="0" y="0"/>
+          <a:chExt cx="0" cy="0"/>
+        </a:xfrm>
+      </p:grpSpPr>
+      <p:sp>
+        <p:nvSpPr>
+          <p:cNvPr id="4" name="Source"/>
+          <p:cNvSpPr/>
+          <p:nvPr/>
+        </p:nvSpPr>
+        <p:spPr>
+          <a:xfrm>
+            <a:off x="1307775" y="1811866"/>
+            <a:ext cx="2963333" cy="2878667"/>
+          </a:xfrm>
+          <a:prstGeom prst="rect">
+            <a:avLst/>
+          </a:prstGeom>
+          <a:solidFill>
+            <a:schemeClr val="accent1"/>
+          </a:solidFill>
+          <a:ln w="12700" cap="flat" cmpd="sng" algn="ctr">
+            <a:solidFill>
+              <a:srgbClr val="41719C"/>
+            </a:solidFill>
+            <a:prstDash val="solid"/>
+            <a:miter lim="800000"/>
+            <a:headEnd type="none" w="med" len="med"/>
+            <a:tailEnd type="none" w="med" len="med"/>
+          </a:ln>
+          <a:effectLst>
+            <a:glow rad="1320800">
+              <a:schemeClr val="accent6">
+                <a:satMod val="175000"/>
+                <a:alpha val="40000"/>
+              </a:schemeClr>
+            </a:glow>
+          </a:effectLst>
+        </p:spPr>
+        <p:style>
+          <a:lnRef idx="2">
+            <a:schemeClr val="accent1">
+              <a:shade val="50000"/>
+            </a:schemeClr>
+          </a:lnRef>
+          <a:fillRef idx="1">
+            <a:schemeClr val="accent1"/>
+          </a:fillRef>
+          <a:effectRef idx="0">
+            <a:schemeClr val="accent1"/>
+          </a:effectRef>
+          <a:fontRef idx="minor">
+            <a:schemeClr val="lt1"/>
+          </a:fontRef>
+        </p:style>
+        <p:txBody>
+          <a:bodyPr rtlCol="0" anchor="ctr"/>
+          <a:lstStyle/>
+          <a:p>
+            <a:pPr algn="ctr"/>
+            <a:endParaRPr lang="en-US" dirty="0">
+              <a:latin typeface="Calibri" panose="020F0502020204030204" pitchFamily="34" charset="0"/>
+            </a:endParaRPr>
+          </a:p>
+        </p:txBody>
+      </p:sp>
+      <p:sp>
+        <p:nvSpPr>
+          <p:cNvPr id="5" name="Destination"/>
+          <p:cNvSpPr/>
+          <p:nvPr/>
+        </p:nvSpPr>
+        <p:spPr>
+          <a:xfrm>
+            <a:off x="8182708" y="1811866"/>
+            <a:ext cx="2319867" cy="2438400"/>
+          </a:xfrm>
+          <a:prstGeom prst="triangle">
+            <a:avLst/>
+          </a:prstGeom>
+          <a:effectLst>
+            <a:glow rad="228600">
+              <a:srgbClr val="68D321">
+                <a:lumMod val="100000"/>
+              </a:srgbClr>
+            </a:glow>
+          </a:effectLst>
+        </p:spPr>
+        <p:style>
+          <a:lnRef idx="2">
+            <a:schemeClr val="accent1">
+              <a:shade val="50000"/>
+            </a:schemeClr>
+          </a:lnRef>
+          <a:fillRef idx="1">
+            <a:schemeClr val="accent1"/>
+          </a:fillRef>
+          <a:effectRef idx="0">
+            <a:schemeClr val="accent1"/>
+          </a:effectRef>
+          <a:fontRef idx="minor">
+            <a:schemeClr val="lt1"/>
+          </a:fontRef>
+        </p:style>
+        <p:txBody>
+          <a:bodyPr rtlCol="0" anchor="ctr"/>
+          <a:lstStyle/>
+          <a:p>
+            <a:pPr algn="ctr"/>
+            <a:endParaRPr lang="en-US" dirty="0"/>
+          </a:p>
+        </p:txBody>
+      </p:sp>
+    </p:spTree>
+    <p:extLst>
+      <p:ext uri="{BB962C8B-B14F-4D97-AF65-F5344CB8AC3E}">
+        <p14:creationId xmlns:p14="http://schemas.microsoft.com/office/powerpoint/2010/main" val="2704902175"/>
+      </p:ext>
+    </p:extLst>
+  </p:cSld>
+  <p:clrMapOvr>
+    <a:masterClrMapping/>
+  </p:clrMapOvr>
+</p:sld>
+</file>
+
+<file path=ppt/slides/slide5.xml><?xml version="1.0" encoding="utf-8"?>
+<p:sld xmlns:a="http://schemas.openxmlformats.org/drawingml/2006/main" xmlns:r="http://schemas.openxmlformats.org/officeDocument/2006/relationships" xmlns:p="http://schemas.openxmlformats.org/presentationml/2006/main">
+  <p:cSld>
+    <p:spTree>
+      <p:nvGrpSpPr>
+        <p:cNvPr id="1" name=""/>
+        <p:cNvGrpSpPr/>
+        <p:nvPr/>
+      </p:nvGrpSpPr>
+      <p:grpSpPr>
+        <a:xfrm>
+          <a:off x="0" y="0"/>
+          <a:ext cx="0" cy="0"/>
+          <a:chOff x="0" y="0"/>
+          <a:chExt cx="0" cy="0"/>
+        </a:xfrm>
+      </p:grpSpPr>
+      <p:sp>
+        <p:nvSpPr>
+          <p:cNvPr id="4" name="Source"/>
+          <p:cNvSpPr/>
+          <p:nvPr/>
+        </p:nvSpPr>
+        <p:spPr>
+          <a:xfrm>
+            <a:off x="1307775" y="1811866"/>
+            <a:ext cx="2963333" cy="2878667"/>
+          </a:xfrm>
+          <a:prstGeom prst="rect">
+            <a:avLst/>
+          </a:prstGeom>
+          <a:solidFill>
+            <a:schemeClr val="accent1"/>
+          </a:solidFill>
+          <a:ln w="12700" cap="flat" cmpd="sng" algn="ctr">
+            <a:solidFill>
+              <a:srgbClr val="41719C"/>
+            </a:solidFill>
+            <a:prstDash val="solid"/>
+            <a:miter lim="800000"/>
+            <a:headEnd type="none" w="med" len="med"/>
+            <a:tailEnd type="none" w="med" len="med"/>
+          </a:ln>
+          <a:effectLst>
+            <a:glow rad="1320800">
+              <a:schemeClr val="accent6">
+                <a:satMod val="175000"/>
+                <a:alpha val="40000"/>
+              </a:schemeClr>
+            </a:glow>
+          </a:effectLst>
+        </p:spPr>
+        <p:style>
+          <a:lnRef idx="2">
+            <a:schemeClr val="accent1">
+              <a:shade val="50000"/>
+            </a:schemeClr>
+          </a:lnRef>
+          <a:fillRef idx="1">
+            <a:schemeClr val="accent1"/>
+          </a:fillRef>
+          <a:effectRef idx="0">
+            <a:schemeClr val="accent1"/>
+          </a:effectRef>
+          <a:fontRef idx="minor">
+            <a:schemeClr val="lt1"/>
+          </a:fontRef>
+        </p:style>
+        <p:txBody>
+          <a:bodyPr rtlCol="0" anchor="ctr"/>
+          <a:lstStyle/>
+          <a:p>
+            <a:pPr algn="ctr"/>
+            <a:endParaRPr lang="en-US" dirty="0">
+              <a:latin typeface="Calibri" panose="020F0502020204030204" pitchFamily="34" charset="0"/>
+            </a:endParaRPr>
+          </a:p>
+        </p:txBody>
+      </p:sp>
+      <p:sp>
+        <p:nvSpPr>
+          <p:cNvPr id="5" name="Destination"/>
+          <p:cNvSpPr/>
+          <p:nvPr/>
+        </p:nvSpPr>
+        <p:spPr>
+          <a:xfrm>
+            <a:off x="8182708" y="1811866"/>
+            <a:ext cx="2319867" cy="2438400"/>
+          </a:xfrm>
+          <a:prstGeom prst="triangle">
+            <a:avLst/>
+          </a:prstGeom>
+          <a:effectLst>
+            <a:glow rad="228600">
+              <a:srgbClr val="68D321">
+                <a:lumMod val="100000"/>
+              </a:srgbClr>
+            </a:glow>
+          </a:effectLst>
+        </p:spPr>
+        <p:style>
+          <a:lnRef idx="2">
+            <a:schemeClr val="accent1">
+              <a:shade val="50000"/>
+            </a:schemeClr>
+          </a:lnRef>
+          <a:fillRef idx="1">
+            <a:schemeClr val="accent1"/>
+          </a:fillRef>
+          <a:effectRef idx="0">
+            <a:schemeClr val="accent1"/>
+          </a:effectRef>
+          <a:fontRef idx="minor">
+            <a:schemeClr val="lt1"/>
+          </a:fontRef>
+        </p:style>
+        <p:txBody>
+          <a:bodyPr rtlCol="0" anchor="ctr"/>
+          <a:lstStyle/>
+          <a:p>
+            <a:pPr algn="ctr"/>
+            <a:endParaRPr lang="en-US" dirty="0"/>
+          </a:p>
+        </p:txBody>
+      </p:sp>
+    </p:spTree>
+    <p:extLst>
+      <p:ext uri="{BB962C8B-B14F-4D97-AF65-F5344CB8AC3E}">
+        <p14:creationId xmlns:p14="http://schemas.microsoft.com/office/powerpoint/2010/main" val="2321785284"/>
+      </p:ext>
+    </p:extLst>
+  </p:cSld>
+  <p:clrMapOvr>
+    <a:masterClrMapping/>
+  </p:clrMapOvr>
+</p:sld>
+</file>
+
+<file path=ppt/slides/slide6.xml><?xml version="1.0" encoding="utf-8"?>
+<p:sld xmlns:a="http://schemas.openxmlformats.org/drawingml/2006/main" xmlns:r="http://schemas.openxmlformats.org/officeDocument/2006/relationships" xmlns:p="http://schemas.openxmlformats.org/presentationml/2006/main">
+  <p:cSld>
+    <p:spTree>
+      <p:nvGrpSpPr>
+        <p:cNvPr id="1" name=""/>
+        <p:cNvGrpSpPr/>
+        <p:nvPr/>
+      </p:nvGrpSpPr>
+      <p:grpSpPr>
+        <a:xfrm>
+          <a:off x="0" y="0"/>
+          <a:ext cx="0" cy="0"/>
+          <a:chOff x="0" y="0"/>
+          <a:chExt cx="0" cy="0"/>
+        </a:xfrm>
+      </p:grpSpPr>
+      <p:sp>
+        <p:nvSpPr>
+          <p:cNvPr id="4" name="Source"/>
+          <p:cNvSpPr/>
+          <p:nvPr/>
+        </p:nvSpPr>
+        <p:spPr>
+          <a:xfrm>
+            <a:off x="1307775" y="1811866"/>
+            <a:ext cx="2963333" cy="2878667"/>
+          </a:xfrm>
+          <a:prstGeom prst="rect">
+            <a:avLst/>
+          </a:prstGeom>
+          <a:solidFill>
+            <a:schemeClr val="accent1"/>
+          </a:solidFill>
+          <a:ln w="12700" cap="flat" cmpd="sng" algn="ctr">
+            <a:solidFill>
+              <a:srgbClr val="41719C"/>
+            </a:solidFill>
+            <a:prstDash val="solid"/>
+            <a:miter lim="800000"/>
+            <a:headEnd type="none" w="med" len="med"/>
+            <a:tailEnd type="none" w="med" len="med"/>
+          </a:ln>
+          <a:effectLst>
+            <a:glow rad="1320800">
+              <a:schemeClr val="accent6">
+                <a:satMod val="175000"/>
+                <a:alpha val="40000"/>
+              </a:schemeClr>
+            </a:glow>
+          </a:effectLst>
+        </p:spPr>
+        <p:style>
+          <a:lnRef idx="2">
+            <a:schemeClr val="accent1">
+              <a:shade val="50000"/>
+            </a:schemeClr>
+          </a:lnRef>
+          <a:fillRef idx="1">
+            <a:schemeClr val="accent1"/>
+          </a:fillRef>
+          <a:effectRef idx="0">
+            <a:schemeClr val="accent1"/>
+          </a:effectRef>
+          <a:fontRef idx="minor">
+            <a:schemeClr val="lt1"/>
+          </a:fontRef>
+        </p:style>
+        <p:txBody>
+          <a:bodyPr rtlCol="0" anchor="ctr"/>
+          <a:lstStyle/>
+          <a:p>
+            <a:pPr algn="ctr"/>
+            <a:endParaRPr lang="en-US" dirty="0">
+              <a:latin typeface="Calibri" panose="020F0502020204030204" pitchFamily="34" charset="0"/>
+            </a:endParaRPr>
+          </a:p>
+        </p:txBody>
+      </p:sp>
+      <p:sp>
+        <p:nvSpPr>
+          <p:cNvPr id="5" name="Destination"/>
+          <p:cNvSpPr/>
+          <p:nvPr/>
+        </p:nvSpPr>
+        <p:spPr>
+          <a:xfrm>
+            <a:off x="8182708" y="1811866"/>
             <a:ext cx="2319867" cy="2438400"/>
           </a:xfrm>
           <a:prstGeom prst="triangle">
@@ -3194,14 +3780,14 @@
           <a:lstStyle/>
           <a:p>
             <a:pPr algn="ctr"/>
-            <a:endParaRPr lang="en-US"/>
+            <a:endParaRPr lang="en-US" dirty="0"/>
           </a:p>
         </p:txBody>
       </p:sp>
     </p:spTree>
     <p:extLst>
       <p:ext uri="{BB962C8B-B14F-4D97-AF65-F5344CB8AC3E}">
-        <p14:creationId xmlns:p14="http://schemas.microsoft.com/office/powerpoint/2010/main" val="1531827367"/>
+        <p14:creationId xmlns:p14="http://schemas.microsoft.com/office/powerpoint/2010/main" val="29943282"/>
       </p:ext>
     </p:extLst>
   </p:cSld>

</xml_diff>